<commit_message>
Passos para caracterização do MZM no Cap 4 concluídos.
</commit_message>
<xml_diff>
--- a/Figures/DDO-OFDM - diagrama.pptx
+++ b/Figures/DDO-OFDM - diagrama.pptx
@@ -305,7 +305,7 @@
             <a:fld id="{3ECEDDD1-02F4-488A-9AC5-C581CF75A9CB}" type="datetimeFigureOut">
               <a:rPr lang="pt-BR" smtClean="0"/>
               <a:pPr/>
-              <a:t>22/11/2013</a:t>
+              <a:t>14/07/2014</a:t>
             </a:fld>
             <a:endParaRPr lang="pt-BR"/>
           </a:p>
@@ -348,7 +348,7 @@
             <a:fld id="{64423969-70E0-4A52-B5D9-B4270798E610}" type="slidenum">
               <a:rPr lang="pt-BR" smtClean="0"/>
               <a:pPr/>
-              <a:t>‹#›</a:t>
+              <a:t>‹nº›</a:t>
             </a:fld>
             <a:endParaRPr lang="pt-BR"/>
           </a:p>
@@ -472,7 +472,7 @@
             <a:fld id="{3ECEDDD1-02F4-488A-9AC5-C581CF75A9CB}" type="datetimeFigureOut">
               <a:rPr lang="pt-BR" smtClean="0"/>
               <a:pPr/>
-              <a:t>22/11/2013</a:t>
+              <a:t>14/07/2014</a:t>
             </a:fld>
             <a:endParaRPr lang="pt-BR"/>
           </a:p>
@@ -515,7 +515,7 @@
             <a:fld id="{64423969-70E0-4A52-B5D9-B4270798E610}" type="slidenum">
               <a:rPr lang="pt-BR" smtClean="0"/>
               <a:pPr/>
-              <a:t>‹#›</a:t>
+              <a:t>‹nº›</a:t>
             </a:fld>
             <a:endParaRPr lang="pt-BR"/>
           </a:p>
@@ -649,7 +649,7 @@
             <a:fld id="{3ECEDDD1-02F4-488A-9AC5-C581CF75A9CB}" type="datetimeFigureOut">
               <a:rPr lang="pt-BR" smtClean="0"/>
               <a:pPr/>
-              <a:t>22/11/2013</a:t>
+              <a:t>14/07/2014</a:t>
             </a:fld>
             <a:endParaRPr lang="pt-BR"/>
           </a:p>
@@ -692,7 +692,7 @@
             <a:fld id="{64423969-70E0-4A52-B5D9-B4270798E610}" type="slidenum">
               <a:rPr lang="pt-BR" smtClean="0"/>
               <a:pPr/>
-              <a:t>‹#›</a:t>
+              <a:t>‹nº›</a:t>
             </a:fld>
             <a:endParaRPr lang="pt-BR"/>
           </a:p>
@@ -816,7 +816,7 @@
             <a:fld id="{3ECEDDD1-02F4-488A-9AC5-C581CF75A9CB}" type="datetimeFigureOut">
               <a:rPr lang="pt-BR" smtClean="0"/>
               <a:pPr/>
-              <a:t>22/11/2013</a:t>
+              <a:t>14/07/2014</a:t>
             </a:fld>
             <a:endParaRPr lang="pt-BR"/>
           </a:p>
@@ -859,7 +859,7 @@
             <a:fld id="{64423969-70E0-4A52-B5D9-B4270798E610}" type="slidenum">
               <a:rPr lang="pt-BR" smtClean="0"/>
               <a:pPr/>
-              <a:t>‹#›</a:t>
+              <a:t>‹nº›</a:t>
             </a:fld>
             <a:endParaRPr lang="pt-BR"/>
           </a:p>
@@ -1059,7 +1059,7 @@
             <a:fld id="{3ECEDDD1-02F4-488A-9AC5-C581CF75A9CB}" type="datetimeFigureOut">
               <a:rPr lang="pt-BR" smtClean="0"/>
               <a:pPr/>
-              <a:t>22/11/2013</a:t>
+              <a:t>14/07/2014</a:t>
             </a:fld>
             <a:endParaRPr lang="pt-BR"/>
           </a:p>
@@ -1102,7 +1102,7 @@
             <a:fld id="{64423969-70E0-4A52-B5D9-B4270798E610}" type="slidenum">
               <a:rPr lang="pt-BR" smtClean="0"/>
               <a:pPr/>
-              <a:t>‹#›</a:t>
+              <a:t>‹nº›</a:t>
             </a:fld>
             <a:endParaRPr lang="pt-BR"/>
           </a:p>
@@ -1344,7 +1344,7 @@
             <a:fld id="{3ECEDDD1-02F4-488A-9AC5-C581CF75A9CB}" type="datetimeFigureOut">
               <a:rPr lang="pt-BR" smtClean="0"/>
               <a:pPr/>
-              <a:t>22/11/2013</a:t>
+              <a:t>14/07/2014</a:t>
             </a:fld>
             <a:endParaRPr lang="pt-BR"/>
           </a:p>
@@ -1387,7 +1387,7 @@
             <a:fld id="{64423969-70E0-4A52-B5D9-B4270798E610}" type="slidenum">
               <a:rPr lang="pt-BR" smtClean="0"/>
               <a:pPr/>
-              <a:t>‹#›</a:t>
+              <a:t>‹nº›</a:t>
             </a:fld>
             <a:endParaRPr lang="pt-BR"/>
           </a:p>
@@ -1763,7 +1763,7 @@
             <a:fld id="{3ECEDDD1-02F4-488A-9AC5-C581CF75A9CB}" type="datetimeFigureOut">
               <a:rPr lang="pt-BR" smtClean="0"/>
               <a:pPr/>
-              <a:t>22/11/2013</a:t>
+              <a:t>14/07/2014</a:t>
             </a:fld>
             <a:endParaRPr lang="pt-BR"/>
           </a:p>
@@ -1806,7 +1806,7 @@
             <a:fld id="{64423969-70E0-4A52-B5D9-B4270798E610}" type="slidenum">
               <a:rPr lang="pt-BR" smtClean="0"/>
               <a:pPr/>
-              <a:t>‹#›</a:t>
+              <a:t>‹nº›</a:t>
             </a:fld>
             <a:endParaRPr lang="pt-BR"/>
           </a:p>
@@ -1878,7 +1878,7 @@
             <a:fld id="{3ECEDDD1-02F4-488A-9AC5-C581CF75A9CB}" type="datetimeFigureOut">
               <a:rPr lang="pt-BR" smtClean="0"/>
               <a:pPr/>
-              <a:t>22/11/2013</a:t>
+              <a:t>14/07/2014</a:t>
             </a:fld>
             <a:endParaRPr lang="pt-BR"/>
           </a:p>
@@ -1921,7 +1921,7 @@
             <a:fld id="{64423969-70E0-4A52-B5D9-B4270798E610}" type="slidenum">
               <a:rPr lang="pt-BR" smtClean="0"/>
               <a:pPr/>
-              <a:t>‹#›</a:t>
+              <a:t>‹nº›</a:t>
             </a:fld>
             <a:endParaRPr lang="pt-BR"/>
           </a:p>
@@ -1970,7 +1970,7 @@
             <a:fld id="{3ECEDDD1-02F4-488A-9AC5-C581CF75A9CB}" type="datetimeFigureOut">
               <a:rPr lang="pt-BR" smtClean="0"/>
               <a:pPr/>
-              <a:t>22/11/2013</a:t>
+              <a:t>14/07/2014</a:t>
             </a:fld>
             <a:endParaRPr lang="pt-BR"/>
           </a:p>
@@ -2013,7 +2013,7 @@
             <a:fld id="{64423969-70E0-4A52-B5D9-B4270798E610}" type="slidenum">
               <a:rPr lang="pt-BR" smtClean="0"/>
               <a:pPr/>
-              <a:t>‹#›</a:t>
+              <a:t>‹nº›</a:t>
             </a:fld>
             <a:endParaRPr lang="pt-BR"/>
           </a:p>
@@ -2244,7 +2244,7 @@
             <a:fld id="{3ECEDDD1-02F4-488A-9AC5-C581CF75A9CB}" type="datetimeFigureOut">
               <a:rPr lang="pt-BR" smtClean="0"/>
               <a:pPr/>
-              <a:t>22/11/2013</a:t>
+              <a:t>14/07/2014</a:t>
             </a:fld>
             <a:endParaRPr lang="pt-BR"/>
           </a:p>
@@ -2287,7 +2287,7 @@
             <a:fld id="{64423969-70E0-4A52-B5D9-B4270798E610}" type="slidenum">
               <a:rPr lang="pt-BR" smtClean="0"/>
               <a:pPr/>
-              <a:t>‹#›</a:t>
+              <a:t>‹nº›</a:t>
             </a:fld>
             <a:endParaRPr lang="pt-BR"/>
           </a:p>
@@ -2494,7 +2494,7 @@
             <a:fld id="{3ECEDDD1-02F4-488A-9AC5-C581CF75A9CB}" type="datetimeFigureOut">
               <a:rPr lang="pt-BR" smtClean="0"/>
               <a:pPr/>
-              <a:t>22/11/2013</a:t>
+              <a:t>14/07/2014</a:t>
             </a:fld>
             <a:endParaRPr lang="pt-BR"/>
           </a:p>
@@ -2537,7 +2537,7 @@
             <a:fld id="{64423969-70E0-4A52-B5D9-B4270798E610}" type="slidenum">
               <a:rPr lang="pt-BR" smtClean="0"/>
               <a:pPr/>
-              <a:t>‹#›</a:t>
+              <a:t>‹nº›</a:t>
             </a:fld>
             <a:endParaRPr lang="pt-BR"/>
           </a:p>
@@ -2704,7 +2704,7 @@
             <a:fld id="{3ECEDDD1-02F4-488A-9AC5-C581CF75A9CB}" type="datetimeFigureOut">
               <a:rPr lang="pt-BR" smtClean="0"/>
               <a:pPr/>
-              <a:t>22/11/2013</a:t>
+              <a:t>14/07/2014</a:t>
             </a:fld>
             <a:endParaRPr lang="pt-BR"/>
           </a:p>
@@ -2783,7 +2783,7 @@
             <a:fld id="{64423969-70E0-4A52-B5D9-B4270798E610}" type="slidenum">
               <a:rPr lang="pt-BR" smtClean="0"/>
               <a:pPr/>
-              <a:t>‹#›</a:t>
+              <a:t>‹nº›</a:t>
             </a:fld>
             <a:endParaRPr lang="pt-BR"/>
           </a:p>
@@ -3125,10 +3125,6 @@
           <a:lstStyle/>
           <a:p>
             <a:pPr algn="ctr"/>
-            <a:r>
-              <a:rPr lang="en-US" dirty="0"/>
-              <a:t>‘</a:t>
-            </a:r>
             <a:endParaRPr lang="en-US" dirty="0"/>
           </a:p>
         </p:txBody>
@@ -4352,7 +4348,7 @@
         </p:nvCxnSpPr>
         <p:spPr>
           <a:xfrm>
-            <a:off x="1511660" y="4481808"/>
+            <a:off x="2287966" y="4481808"/>
             <a:ext cx="447830" cy="0"/>
           </a:xfrm>
           <a:prstGeom prst="line">
@@ -4428,8 +4424,8 @@
         </p:nvSpPr>
         <p:spPr>
           <a:xfrm>
-            <a:off x="87008" y="4000693"/>
-            <a:ext cx="1460656" cy="307777"/>
+            <a:off x="-78608" y="4000693"/>
+            <a:ext cx="2058320" cy="307777"/>
           </a:xfrm>
           <a:prstGeom prst="rect">
             <a:avLst/>
@@ -4443,26 +4439,44 @@
           <a:lstStyle/>
           <a:p>
             <a:r>
-              <a:rPr lang="en-US" sz="1400" dirty="0">
+              <a:rPr lang="en-US" sz="1400" dirty="0" err="1" smtClean="0">
                 <a:latin typeface="Arial" pitchFamily="34" charset="0"/>
                 <a:cs typeface="Arial" pitchFamily="34" charset="0"/>
               </a:rPr>
-              <a:t>Electrical</a:t>
-            </a:r>
-            <a:r>
-              <a:rPr lang="pt-BR" sz="1400" dirty="0">
+              <a:t>Sinal</a:t>
+            </a:r>
+            <a:r>
+              <a:rPr lang="en-US" sz="1400" dirty="0" smtClean="0">
                 <a:latin typeface="Arial" pitchFamily="34" charset="0"/>
                 <a:cs typeface="Arial" pitchFamily="34" charset="0"/>
               </a:rPr>
               <a:t> </a:t>
             </a:r>
             <a:r>
-              <a:rPr lang="en-US" sz="1400" dirty="0">
+              <a:rPr lang="en-US" sz="1400" dirty="0" err="1" smtClean="0">
                 <a:latin typeface="Arial" pitchFamily="34" charset="0"/>
                 <a:cs typeface="Arial" pitchFamily="34" charset="0"/>
               </a:rPr>
-              <a:t>Signal</a:t>
-            </a:r>
+              <a:t>Analógico</a:t>
+            </a:r>
+            <a:r>
+              <a:rPr lang="en-US" sz="1400" dirty="0" smtClean="0">
+                <a:latin typeface="Arial" pitchFamily="34" charset="0"/>
+                <a:cs typeface="Arial" pitchFamily="34" charset="0"/>
+              </a:rPr>
+              <a:t> </a:t>
+            </a:r>
+            <a:r>
+              <a:rPr lang="en-US" sz="1400" dirty="0" err="1" smtClean="0">
+                <a:latin typeface="Arial" pitchFamily="34" charset="0"/>
+                <a:cs typeface="Arial" pitchFamily="34" charset="0"/>
+              </a:rPr>
+              <a:t>Elétrico</a:t>
+            </a:r>
+            <a:endParaRPr lang="en-US" sz="1400" dirty="0">
+              <a:latin typeface="Arial" pitchFamily="34" charset="0"/>
+              <a:cs typeface="Arial" pitchFamily="34" charset="0"/>
+            </a:endParaRPr>
           </a:p>
         </p:txBody>
       </p:sp>
@@ -4474,8 +4488,8 @@
         </p:nvSpPr>
         <p:spPr>
           <a:xfrm>
-            <a:off x="76906" y="4318053"/>
-            <a:ext cx="1290738" cy="307777"/>
+            <a:off x="-71665" y="4318053"/>
+            <a:ext cx="1151277" cy="307777"/>
           </a:xfrm>
           <a:prstGeom prst="rect">
             <a:avLst/>
@@ -4489,26 +4503,30 @@
           <a:lstStyle/>
           <a:p>
             <a:r>
-              <a:rPr lang="en-US" sz="1400" dirty="0">
+              <a:rPr lang="en-US" sz="1400" dirty="0" err="1" smtClean="0">
                 <a:latin typeface="Arial" pitchFamily="34" charset="0"/>
                 <a:cs typeface="Arial" pitchFamily="34" charset="0"/>
               </a:rPr>
-              <a:t>Optical</a:t>
-            </a:r>
-            <a:r>
-              <a:rPr lang="pt-BR" sz="1400" dirty="0">
+              <a:t>Sinal</a:t>
+            </a:r>
+            <a:r>
+              <a:rPr lang="en-US" sz="1400" dirty="0" smtClean="0">
                 <a:latin typeface="Arial" pitchFamily="34" charset="0"/>
                 <a:cs typeface="Arial" pitchFamily="34" charset="0"/>
               </a:rPr>
               <a:t> </a:t>
             </a:r>
             <a:r>
-              <a:rPr lang="en-US" sz="1400" dirty="0">
+              <a:rPr lang="en-US" sz="1400" dirty="0" err="1" smtClean="0">
                 <a:latin typeface="Arial" pitchFamily="34" charset="0"/>
                 <a:cs typeface="Arial" pitchFamily="34" charset="0"/>
               </a:rPr>
-              <a:t>Signal</a:t>
-            </a:r>
+              <a:t>Óptico</a:t>
+            </a:r>
+            <a:endParaRPr lang="en-US" sz="1400" dirty="0">
+              <a:latin typeface="Arial" pitchFamily="34" charset="0"/>
+              <a:cs typeface="Arial" pitchFamily="34" charset="0"/>
+            </a:endParaRPr>
           </a:p>
         </p:txBody>
       </p:sp>
@@ -4852,24 +4870,28 @@
             <a:p>
               <a:pPr algn="ctr"/>
               <a:r>
-                <a:rPr lang="en-US" sz="1200" i="1" dirty="0">
+                <a:rPr lang="en-US" sz="1200" i="1" dirty="0" err="1" smtClean="0">
                   <a:latin typeface="Arial" pitchFamily="34" charset="0"/>
                   <a:cs typeface="Arial" pitchFamily="34" charset="0"/>
                 </a:rPr>
-                <a:t>Defined</a:t>
+                <a:t>Definido</a:t>
               </a:r>
-            </a:p>
-            <a:p>
-              <a:pPr algn="ctr"/>
               <a:r>
-                <a:rPr lang="pt-BR" sz="1200" i="1" dirty="0" err="1">
+                <a:rPr lang="en-US" sz="1200" i="1" dirty="0" smtClean="0">
                   <a:latin typeface="Arial" pitchFamily="34" charset="0"/>
                   <a:cs typeface="Arial" pitchFamily="34" charset="0"/>
                 </a:rPr>
-                <a:t>by</a:t>
+                <a:t> </a:t>
               </a:r>
               <a:r>
-                <a:rPr lang="pt-BR" sz="1200" i="1" dirty="0">
+                <a:rPr lang="en-US" sz="1200" i="1" dirty="0" err="1" smtClean="0">
+                  <a:latin typeface="Arial" pitchFamily="34" charset="0"/>
+                  <a:cs typeface="Arial" pitchFamily="34" charset="0"/>
+                </a:rPr>
+                <a:t>por</a:t>
+              </a:r>
+              <a:r>
+                <a:rPr lang="pt-BR" sz="1200" i="1" dirty="0" smtClean="0">
                   <a:latin typeface="Arial" pitchFamily="34" charset="0"/>
                   <a:cs typeface="Arial" pitchFamily="34" charset="0"/>
                 </a:rPr>
@@ -5009,9 +5031,10 @@
           <a:p>
             <a:pPr algn="ctr"/>
             <a:r>
-              <a:rPr lang="en-US" dirty="0"/>
-              <a:t>Analysis</a:t>
-            </a:r>
+              <a:rPr lang="en-US" dirty="0" err="1" smtClean="0"/>
+              <a:t>Análises</a:t>
+            </a:r>
+            <a:endParaRPr lang="en-US" dirty="0"/>
           </a:p>
           <a:p>
             <a:pPr algn="ctr"/>
@@ -5217,8 +5240,8 @@
         </p:nvSpPr>
         <p:spPr>
           <a:xfrm>
-            <a:off x="4103949" y="1627775"/>
-            <a:ext cx="1459054" cy="307777"/>
+            <a:off x="4084328" y="1604327"/>
+            <a:ext cx="1499129" cy="307777"/>
           </a:xfrm>
           <a:prstGeom prst="rect">
             <a:avLst/>
@@ -5240,18 +5263,18 @@
               <a:t>40 km </a:t>
             </a:r>
             <a:r>
-              <a:rPr lang="en-US" sz="1400" b="1" dirty="0">
+              <a:rPr lang="pt-BR" sz="1400" b="1" dirty="0" smtClean="0">
                 <a:latin typeface="Arial" pitchFamily="34" charset="0"/>
                 <a:cs typeface="Arial" pitchFamily="34" charset="0"/>
               </a:rPr>
-              <a:t>of</a:t>
+              <a:t>de </a:t>
             </a:r>
             <a:r>
               <a:rPr lang="pt-BR" sz="1400" b="1" dirty="0">
                 <a:latin typeface="Arial" pitchFamily="34" charset="0"/>
                 <a:cs typeface="Arial" pitchFamily="34" charset="0"/>
               </a:rPr>
-              <a:t> SSMF</a:t>
+              <a:t>SSMF</a:t>
             </a:r>
           </a:p>
         </p:txBody>
@@ -5364,31 +5387,35 @@
             <a:p>
               <a:pPr algn="ctr"/>
               <a:r>
-                <a:rPr lang="en-US" sz="1200" i="1" dirty="0">
+                <a:rPr lang="en-US" sz="1200" i="1" dirty="0" err="1" smtClean="0">
                   <a:latin typeface="Arial" pitchFamily="34" charset="0"/>
                   <a:cs typeface="Arial" pitchFamily="34" charset="0"/>
                 </a:rPr>
-                <a:t>Defined</a:t>
-              </a:r>
-            </a:p>
-            <a:p>
-              <a:pPr algn="ctr"/>
-              <a:r>
-                <a:rPr lang="pt-BR" sz="1200" i="1" dirty="0" err="1">
-                  <a:latin typeface="Arial" pitchFamily="34" charset="0"/>
-                  <a:cs typeface="Arial" pitchFamily="34" charset="0"/>
-                </a:rPr>
-                <a:t>by</a:t>
+                <a:t>Definido</a:t>
               </a:r>
               <a:r>
-                <a:rPr lang="pt-BR" sz="1200" i="1" dirty="0">
+                <a:rPr lang="en-US" sz="1200" i="1" dirty="0" smtClean="0">
                   <a:latin typeface="Arial" pitchFamily="34" charset="0"/>
                   <a:cs typeface="Arial" pitchFamily="34" charset="0"/>
                 </a:rPr>
                 <a:t> </a:t>
               </a:r>
               <a:r>
-                <a:rPr lang="pt-BR" sz="1200" i="1" dirty="0">
+                <a:rPr lang="en-US" sz="1200" i="1" dirty="0" err="1" smtClean="0">
+                  <a:latin typeface="Arial" pitchFamily="34" charset="0"/>
+                  <a:cs typeface="Arial" pitchFamily="34" charset="0"/>
+                </a:rPr>
+                <a:t>por</a:t>
+              </a:r>
+              <a:r>
+                <a:rPr lang="en-US" sz="1200" i="1" dirty="0" smtClean="0">
+                  <a:latin typeface="Arial" pitchFamily="34" charset="0"/>
+                  <a:cs typeface="Arial" pitchFamily="34" charset="0"/>
+                </a:rPr>
+                <a:t> </a:t>
+              </a:r>
+              <a:r>
+                <a:rPr lang="pt-BR" sz="1200" i="1" dirty="0" smtClean="0">
                   <a:solidFill>
                     <a:srgbClr val="7030A0"/>
                   </a:solidFill>
@@ -5397,6 +5424,13 @@
                 </a:rPr>
                 <a:t>Software</a:t>
               </a:r>
+              <a:endParaRPr lang="pt-BR" sz="1200" i="1" dirty="0">
+                <a:solidFill>
+                  <a:srgbClr val="7030A0"/>
+                </a:solidFill>
+                <a:latin typeface="Arial" pitchFamily="34" charset="0"/>
+                <a:cs typeface="Arial" pitchFamily="34" charset="0"/>
+              </a:endParaRPr>
             </a:p>
           </p:txBody>
         </p:sp>
@@ -5409,7 +5443,7 @@
         </p:nvCxnSpPr>
         <p:spPr>
           <a:xfrm flipH="1">
-            <a:off x="1516018" y="4164448"/>
+            <a:off x="2292324" y="4164448"/>
             <a:ext cx="443472" cy="0"/>
           </a:xfrm>
           <a:prstGeom prst="line">
@@ -5444,7 +5478,7 @@
         </p:nvCxnSpPr>
         <p:spPr>
           <a:xfrm flipH="1">
-            <a:off x="1511660" y="4164448"/>
+            <a:off x="2287966" y="4164448"/>
             <a:ext cx="443472" cy="0"/>
           </a:xfrm>
           <a:prstGeom prst="line">
@@ -5916,7 +5950,7 @@
         </p:nvCxnSpPr>
         <p:spPr>
           <a:xfrm flipH="1">
-            <a:off x="1501992" y="3869743"/>
+            <a:off x="2278292" y="3869743"/>
             <a:ext cx="453815" cy="1194"/>
           </a:xfrm>
           <a:prstGeom prst="line">
@@ -5950,7 +5984,7 @@
         </p:nvCxnSpPr>
         <p:spPr>
           <a:xfrm flipH="1">
-            <a:off x="1501991" y="3870936"/>
+            <a:off x="2278291" y="3870936"/>
             <a:ext cx="457505" cy="0"/>
           </a:xfrm>
           <a:prstGeom prst="line">
@@ -5985,8 +6019,8 @@
         </p:nvSpPr>
         <p:spPr>
           <a:xfrm>
-            <a:off x="85532" y="3692918"/>
-            <a:ext cx="1390124" cy="307777"/>
+            <a:off x="-72516" y="3692918"/>
+            <a:ext cx="1938351" cy="307777"/>
           </a:xfrm>
           <a:prstGeom prst="rect">
             <a:avLst/>
@@ -6000,12 +6034,44 @@
           <a:lstStyle/>
           <a:p>
             <a:r>
-              <a:rPr lang="en-US" sz="1400" dirty="0">
+              <a:rPr lang="en-US" sz="1400" dirty="0" err="1" smtClean="0">
                 <a:latin typeface="Arial" pitchFamily="34" charset="0"/>
                 <a:cs typeface="Arial" pitchFamily="34" charset="0"/>
               </a:rPr>
-              <a:t>Discrete Signal</a:t>
-            </a:r>
+              <a:t>Sinal</a:t>
+            </a:r>
+            <a:r>
+              <a:rPr lang="en-US" sz="1400" dirty="0" smtClean="0">
+                <a:latin typeface="Arial" pitchFamily="34" charset="0"/>
+                <a:cs typeface="Arial" pitchFamily="34" charset="0"/>
+              </a:rPr>
+              <a:t> </a:t>
+            </a:r>
+            <a:r>
+              <a:rPr lang="en-US" sz="1400" dirty="0" err="1" smtClean="0">
+                <a:latin typeface="Arial" pitchFamily="34" charset="0"/>
+                <a:cs typeface="Arial" pitchFamily="34" charset="0"/>
+              </a:rPr>
+              <a:t>Discreto</a:t>
+            </a:r>
+            <a:r>
+              <a:rPr lang="en-US" sz="1400" dirty="0" smtClean="0">
+                <a:latin typeface="Arial" pitchFamily="34" charset="0"/>
+                <a:cs typeface="Arial" pitchFamily="34" charset="0"/>
+              </a:rPr>
+              <a:t> </a:t>
+            </a:r>
+            <a:r>
+              <a:rPr lang="en-US" sz="1400" dirty="0" err="1" smtClean="0">
+                <a:latin typeface="Arial" pitchFamily="34" charset="0"/>
+                <a:cs typeface="Arial" pitchFamily="34" charset="0"/>
+              </a:rPr>
+              <a:t>Elétrico</a:t>
+            </a:r>
+            <a:endParaRPr lang="en-US" sz="1400" dirty="0">
+              <a:latin typeface="Arial" pitchFamily="34" charset="0"/>
+              <a:cs typeface="Arial" pitchFamily="34" charset="0"/>
+            </a:endParaRPr>
           </a:p>
         </p:txBody>
       </p:sp>
@@ -6017,8 +6083,8 @@
         </p:nvSpPr>
         <p:spPr>
           <a:xfrm>
-            <a:off x="6371709" y="3005644"/>
-            <a:ext cx="1008609" cy="261738"/>
+            <a:off x="6660232" y="3005644"/>
+            <a:ext cx="936475" cy="261738"/>
           </a:xfrm>
           <a:prstGeom prst="rect">
             <a:avLst/>
@@ -6033,7 +6099,7 @@
           <a:p>
             <a:pPr algn="ctr"/>
             <a:r>
-              <a:rPr lang="en-US" sz="1101" dirty="0">
+              <a:rPr lang="en-US" sz="1101" dirty="0" smtClean="0">
                 <a:solidFill>
                   <a:schemeClr val="accent1">
                     <a:lumMod val="60000"/>
@@ -6043,8 +6109,31 @@
                 <a:latin typeface="Arial" pitchFamily="34" charset="0"/>
                 <a:cs typeface="Arial" pitchFamily="34" charset="0"/>
               </a:rPr>
-              <a:t>Physical Part</a:t>
-            </a:r>
+              <a:t>Parte </a:t>
+            </a:r>
+            <a:r>
+              <a:rPr lang="en-US" sz="1101" dirty="0" err="1" smtClean="0">
+                <a:solidFill>
+                  <a:schemeClr val="accent1">
+                    <a:lumMod val="60000"/>
+                    <a:lumOff val="40000"/>
+                  </a:schemeClr>
+                </a:solidFill>
+                <a:latin typeface="Arial" pitchFamily="34" charset="0"/>
+                <a:cs typeface="Arial" pitchFamily="34" charset="0"/>
+              </a:rPr>
+              <a:t>Física</a:t>
+            </a:r>
+            <a:endParaRPr lang="en-US" sz="1101" dirty="0">
+              <a:solidFill>
+                <a:schemeClr val="accent1">
+                  <a:lumMod val="60000"/>
+                  <a:lumOff val="40000"/>
+                </a:schemeClr>
+              </a:solidFill>
+              <a:latin typeface="Arial" pitchFamily="34" charset="0"/>
+              <a:cs typeface="Arial" pitchFamily="34" charset="0"/>
+            </a:endParaRPr>
           </a:p>
         </p:txBody>
       </p:sp>
@@ -6056,8 +6145,8 @@
         </p:nvSpPr>
         <p:spPr>
           <a:xfrm>
-            <a:off x="7923503" y="4276823"/>
-            <a:ext cx="1144864" cy="276999"/>
+            <a:off x="7471391" y="4403236"/>
+            <a:ext cx="1709121" cy="276999"/>
           </a:xfrm>
           <a:prstGeom prst="rect">
             <a:avLst/>
@@ -6072,7 +6161,31 @@
           <a:p>
             <a:pPr algn="ctr"/>
             <a:r>
-              <a:rPr lang="en-US" sz="1200" b="1" dirty="0">
+              <a:rPr lang="en-US" sz="1200" b="1" dirty="0" err="1" smtClean="0">
+                <a:solidFill>
+                  <a:schemeClr val="bg1">
+                    <a:lumMod val="65000"/>
+                  </a:schemeClr>
+                </a:solidFill>
+                <a:latin typeface="Arial" pitchFamily="34" charset="0"/>
+                <a:cs typeface="Arial" pitchFamily="34" charset="0"/>
+              </a:rPr>
+              <a:t>Configuração</a:t>
+            </a:r>
+            <a:r>
+              <a:rPr lang="en-US" sz="1200" b="1" dirty="0" smtClean="0">
+                <a:solidFill>
+                  <a:schemeClr val="bg1">
+                    <a:lumMod val="65000"/>
+                  </a:schemeClr>
+                </a:solidFill>
+                <a:latin typeface="Arial" pitchFamily="34" charset="0"/>
+                <a:cs typeface="Arial" pitchFamily="34" charset="0"/>
+              </a:rPr>
+              <a:t> </a:t>
+            </a:r>
+            <a:r>
+              <a:rPr lang="en-US" sz="1200" b="1" i="1" dirty="0" smtClean="0">
                 <a:solidFill>
                   <a:schemeClr val="bg1">
                     <a:lumMod val="65000"/>
@@ -6083,18 +6196,15 @@
               </a:rPr>
               <a:t>Offline</a:t>
             </a:r>
-            <a:r>
-              <a:rPr lang="pt-BR" sz="1200" b="1" dirty="0">
-                <a:solidFill>
-                  <a:schemeClr val="bg1">
-                    <a:lumMod val="65000"/>
-                  </a:schemeClr>
-                </a:solidFill>
-                <a:latin typeface="Arial" pitchFamily="34" charset="0"/>
-                <a:cs typeface="Arial" pitchFamily="34" charset="0"/>
-              </a:rPr>
-              <a:t> Setup</a:t>
-            </a:r>
+            <a:endParaRPr lang="pt-BR" sz="1200" b="1" i="1" dirty="0">
+              <a:solidFill>
+                <a:schemeClr val="bg1">
+                  <a:lumMod val="65000"/>
+                </a:schemeClr>
+              </a:solidFill>
+              <a:latin typeface="Arial" pitchFamily="34" charset="0"/>
+              <a:cs typeface="Arial" pitchFamily="34" charset="0"/>
+            </a:endParaRPr>
           </a:p>
         </p:txBody>
       </p:sp>
@@ -8072,6 +8182,78 @@
           </a:fontRef>
         </p:style>
       </p:cxnSp>
+      <p:cxnSp>
+        <p:nvCxnSpPr>
+          <p:cNvPr id="134" name="Conector de seta reta 133"/>
+          <p:cNvCxnSpPr/>
+          <p:nvPr/>
+        </p:nvCxnSpPr>
+        <p:spPr>
+          <a:xfrm flipV="1">
+            <a:off x="1987557" y="2250443"/>
+            <a:ext cx="162016" cy="184378"/>
+          </a:xfrm>
+          <a:prstGeom prst="straightConnector1">
+            <a:avLst/>
+          </a:prstGeom>
+          <a:ln>
+            <a:solidFill>
+              <a:srgbClr val="FF0000"/>
+            </a:solidFill>
+            <a:tailEnd type="arrow"/>
+          </a:ln>
+        </p:spPr>
+        <p:style>
+          <a:lnRef idx="2">
+            <a:schemeClr val="accent2"/>
+          </a:lnRef>
+          <a:fillRef idx="0">
+            <a:schemeClr val="accent2"/>
+          </a:fillRef>
+          <a:effectRef idx="1">
+            <a:schemeClr val="accent2"/>
+          </a:effectRef>
+          <a:fontRef idx="minor">
+            <a:schemeClr val="tx1"/>
+          </a:fontRef>
+        </p:style>
+      </p:cxnSp>
+      <p:cxnSp>
+        <p:nvCxnSpPr>
+          <p:cNvPr id="139" name="Conector de seta reta 138"/>
+          <p:cNvCxnSpPr/>
+          <p:nvPr/>
+        </p:nvCxnSpPr>
+        <p:spPr>
+          <a:xfrm flipV="1">
+            <a:off x="2020556" y="2367983"/>
+            <a:ext cx="162016" cy="184378"/>
+          </a:xfrm>
+          <a:prstGeom prst="straightConnector1">
+            <a:avLst/>
+          </a:prstGeom>
+          <a:ln>
+            <a:solidFill>
+              <a:srgbClr val="FF0000"/>
+            </a:solidFill>
+            <a:tailEnd type="arrow"/>
+          </a:ln>
+        </p:spPr>
+        <p:style>
+          <a:lnRef idx="2">
+            <a:schemeClr val="accent2"/>
+          </a:lnRef>
+          <a:fillRef idx="0">
+            <a:schemeClr val="accent2"/>
+          </a:fillRef>
+          <a:effectRef idx="1">
+            <a:schemeClr val="accent2"/>
+          </a:effectRef>
+          <a:fontRef idx="minor">
+            <a:schemeClr val="tx1"/>
+          </a:fontRef>
+        </p:style>
+      </p:cxnSp>
     </p:spTree>
   </p:cSld>
   <p:clrMapOvr>

</xml_diff>